<commit_message>
Added small save the date
</commit_message>
<xml_diff>
--- a/ppt/SaveTheDateQR.pptx
+++ b/ppt/SaveTheDateQR.pptx
@@ -243,7 +243,7 @@
           <a:p>
             <a:fld id="{16724C03-6B23-3848-B7A8-31DC9B7E80AC}" type="datetimeFigureOut">
               <a:rPr lang="en-US" smtClean="0"/>
-              <a:t>8/27/25</a:t>
+              <a:t>8/30/25</a:t>
             </a:fld>
             <a:endParaRPr lang="en-US"/>
           </a:p>
@@ -413,7 +413,7 @@
           <a:p>
             <a:fld id="{16724C03-6B23-3848-B7A8-31DC9B7E80AC}" type="datetimeFigureOut">
               <a:rPr lang="en-US" smtClean="0"/>
-              <a:t>8/27/25</a:t>
+              <a:t>8/30/25</a:t>
             </a:fld>
             <a:endParaRPr lang="en-US"/>
           </a:p>
@@ -593,7 +593,7 @@
           <a:p>
             <a:fld id="{16724C03-6B23-3848-B7A8-31DC9B7E80AC}" type="datetimeFigureOut">
               <a:rPr lang="en-US" smtClean="0"/>
-              <a:t>8/27/25</a:t>
+              <a:t>8/30/25</a:t>
             </a:fld>
             <a:endParaRPr lang="en-US"/>
           </a:p>
@@ -763,7 +763,7 @@
           <a:p>
             <a:fld id="{16724C03-6B23-3848-B7A8-31DC9B7E80AC}" type="datetimeFigureOut">
               <a:rPr lang="en-US" smtClean="0"/>
-              <a:t>8/27/25</a:t>
+              <a:t>8/30/25</a:t>
             </a:fld>
             <a:endParaRPr lang="en-US"/>
           </a:p>
@@ -1009,7 +1009,7 @@
           <a:p>
             <a:fld id="{16724C03-6B23-3848-B7A8-31DC9B7E80AC}" type="datetimeFigureOut">
               <a:rPr lang="en-US" smtClean="0"/>
-              <a:t>8/27/25</a:t>
+              <a:t>8/30/25</a:t>
             </a:fld>
             <a:endParaRPr lang="en-US"/>
           </a:p>
@@ -1241,7 +1241,7 @@
           <a:p>
             <a:fld id="{16724C03-6B23-3848-B7A8-31DC9B7E80AC}" type="datetimeFigureOut">
               <a:rPr lang="en-US" smtClean="0"/>
-              <a:t>8/27/25</a:t>
+              <a:t>8/30/25</a:t>
             </a:fld>
             <a:endParaRPr lang="en-US"/>
           </a:p>
@@ -1608,7 +1608,7 @@
           <a:p>
             <a:fld id="{16724C03-6B23-3848-B7A8-31DC9B7E80AC}" type="datetimeFigureOut">
               <a:rPr lang="en-US" smtClean="0"/>
-              <a:t>8/27/25</a:t>
+              <a:t>8/30/25</a:t>
             </a:fld>
             <a:endParaRPr lang="en-US"/>
           </a:p>
@@ -1726,7 +1726,7 @@
           <a:p>
             <a:fld id="{16724C03-6B23-3848-B7A8-31DC9B7E80AC}" type="datetimeFigureOut">
               <a:rPr lang="en-US" smtClean="0"/>
-              <a:t>8/27/25</a:t>
+              <a:t>8/30/25</a:t>
             </a:fld>
             <a:endParaRPr lang="en-US"/>
           </a:p>
@@ -1821,7 +1821,7 @@
           <a:p>
             <a:fld id="{16724C03-6B23-3848-B7A8-31DC9B7E80AC}" type="datetimeFigureOut">
               <a:rPr lang="en-US" smtClean="0"/>
-              <a:t>8/27/25</a:t>
+              <a:t>8/30/25</a:t>
             </a:fld>
             <a:endParaRPr lang="en-US"/>
           </a:p>
@@ -2098,7 +2098,7 @@
           <a:p>
             <a:fld id="{16724C03-6B23-3848-B7A8-31DC9B7E80AC}" type="datetimeFigureOut">
               <a:rPr lang="en-US" smtClean="0"/>
-              <a:t>8/27/25</a:t>
+              <a:t>8/30/25</a:t>
             </a:fld>
             <a:endParaRPr lang="en-US"/>
           </a:p>
@@ -2355,7 +2355,7 @@
           <a:p>
             <a:fld id="{16724C03-6B23-3848-B7A8-31DC9B7E80AC}" type="datetimeFigureOut">
               <a:rPr lang="en-US" smtClean="0"/>
-              <a:t>8/27/25</a:t>
+              <a:t>8/30/25</a:t>
             </a:fld>
             <a:endParaRPr lang="en-US"/>
           </a:p>
@@ -2568,7 +2568,7 @@
           <a:p>
             <a:fld id="{16724C03-6B23-3848-B7A8-31DC9B7E80AC}" type="datetimeFigureOut">
               <a:rPr lang="en-US" smtClean="0"/>
-              <a:t>8/27/25</a:t>
+              <a:t>8/30/25</a:t>
             </a:fld>
             <a:endParaRPr lang="en-US"/>
           </a:p>
@@ -2987,7 +2987,7 @@
         </p:nvSpPr>
         <p:spPr>
           <a:xfrm>
-            <a:off x="203200" y="186267"/>
+            <a:off x="168883" y="144046"/>
             <a:ext cx="6976533" cy="8957733"/>
           </a:xfrm>
           <a:prstGeom prst="rect">
@@ -2996,7 +2996,7 @@
           <a:noFill/>
           <a:ln w="38100">
             <a:solidFill>
-              <a:srgbClr val="FF0000"/>
+              <a:srgbClr val="F6A7CC"/>
             </a:solidFill>
           </a:ln>
         </p:spPr>
@@ -3021,7 +3021,11 @@
           <a:lstStyle/>
           <a:p>
             <a:pPr algn="ctr"/>
-            <a:endParaRPr lang="en-US" dirty="0"/>
+            <a:endParaRPr lang="en-US" dirty="0">
+              <a:solidFill>
+                <a:srgbClr val="FF0000"/>
+              </a:solidFill>
+            </a:endParaRPr>
           </a:p>
         </p:txBody>
       </p:sp>
@@ -3039,7 +3043,7 @@
         </p:nvSpPr>
         <p:spPr>
           <a:xfrm>
-            <a:off x="305795" y="357841"/>
+            <a:off x="271478" y="310001"/>
             <a:ext cx="6771341" cy="8606118"/>
           </a:xfrm>
           <a:prstGeom prst="rect">
@@ -3139,7 +3143,7 @@
         </p:blipFill>
         <p:spPr>
           <a:xfrm>
-            <a:off x="515346" y="559173"/>
+            <a:off x="389843" y="559173"/>
             <a:ext cx="1331383" cy="1313749"/>
           </a:xfrm>
           <a:prstGeom prst="rect">
@@ -3330,8 +3334,8 @@
         </p:nvSpPr>
         <p:spPr>
           <a:xfrm>
-            <a:off x="1371912" y="4950903"/>
-            <a:ext cx="5235227" cy="1754326"/>
+            <a:off x="1227617" y="4988831"/>
+            <a:ext cx="4873905" cy="1754326"/>
           </a:xfrm>
           <a:prstGeom prst="rect">
             <a:avLst/>
@@ -3346,21 +3350,21 @@
           <a:p>
             <a:pPr algn="ctr"/>
             <a:r>
-              <a:rPr lang="en-US" sz="3000" b="1" dirty="0"/>
+              <a:rPr lang="en-US" sz="3000" b="1" u="sng" dirty="0"/>
               <a:t>Hosted by</a:t>
             </a:r>
             <a:br>
-              <a:rPr lang="en-US" sz="3000" b="1" dirty="0"/>
+              <a:rPr lang="en-US" sz="3000" b="1" u="sng" dirty="0"/>
             </a:br>
             <a:r>
-              <a:rPr lang="en-US" sz="3000" b="1" dirty="0"/>
+              <a:rPr lang="en-US" sz="3000" b="1" u="sng" dirty="0"/>
               <a:t>The Cary Woman’s Club &amp; </a:t>
             </a:r>
             <a:br>
-              <a:rPr lang="en-US" sz="3000" b="1" dirty="0"/>
+              <a:rPr lang="en-US" sz="3000" b="1" u="sng" dirty="0"/>
             </a:br>
             <a:r>
-              <a:rPr lang="en-US" sz="3000" b="1" dirty="0"/>
+              <a:rPr lang="en-US" sz="3000" b="1" u="sng" dirty="0"/>
               <a:t>Mom Wishing Widows Well</a:t>
             </a:r>
           </a:p>

</xml_diff>